<commit_message>
Add more app icons
</commit_message>
<xml_diff>
--- a/Icon/Icon.pptx
+++ b/Icon/Icon.pptx
@@ -2,19 +2,19 @@
 <file path=ppt/presentation.xml><?xml version="1.0" encoding="utf-8"?>
 <p:presentation xmlns:a="http://schemas.openxmlformats.org/drawingml/2006/main" xmlns:r="http://schemas.openxmlformats.org/officeDocument/2006/relationships" xmlns:p="http://schemas.openxmlformats.org/presentationml/2006/main" saveSubsetFonts="1" autoCompressPictures="0">
   <p:sldMasterIdLst>
-    <p:sldMasterId id="2147483720" r:id="rId1"/>
+    <p:sldMasterId id="2147483732" r:id="rId1"/>
   </p:sldMasterIdLst>
   <p:sldIdLst>
     <p:sldId id="256" r:id="rId2"/>
   </p:sldIdLst>
-  <p:sldSz cx="4059238" cy="3044825"/>
+  <p:sldSz cx="13003213" cy="13003213"/>
   <p:notesSz cx="6858000" cy="9144000"/>
   <p:defaultTextStyle>
     <a:defPPr>
       <a:defRPr lang="en-US"/>
     </a:defPPr>
-    <a:lvl1pPr marL="0" algn="l" defTabSz="340824" rtl="0" eaLnBrk="1" latinLnBrk="0" hangingPunct="1">
-      <a:defRPr sz="671" kern="1200">
+    <a:lvl1pPr marL="0" algn="l" defTabSz="1247654" rtl="0" eaLnBrk="1" latinLnBrk="0" hangingPunct="1">
+      <a:defRPr sz="2456" kern="1200">
         <a:solidFill>
           <a:schemeClr val="tx1"/>
         </a:solidFill>
@@ -23,8 +23,8 @@
         <a:cs typeface="+mn-cs"/>
       </a:defRPr>
     </a:lvl1pPr>
-    <a:lvl2pPr marL="170411" algn="l" defTabSz="340824" rtl="0" eaLnBrk="1" latinLnBrk="0" hangingPunct="1">
-      <a:defRPr sz="671" kern="1200">
+    <a:lvl2pPr marL="623824" algn="l" defTabSz="1247654" rtl="0" eaLnBrk="1" latinLnBrk="0" hangingPunct="1">
+      <a:defRPr sz="2456" kern="1200">
         <a:solidFill>
           <a:schemeClr val="tx1"/>
         </a:solidFill>
@@ -33,8 +33,8 @@
         <a:cs typeface="+mn-cs"/>
       </a:defRPr>
     </a:lvl2pPr>
-    <a:lvl3pPr marL="340824" algn="l" defTabSz="340824" rtl="0" eaLnBrk="1" latinLnBrk="0" hangingPunct="1">
-      <a:defRPr sz="671" kern="1200">
+    <a:lvl3pPr marL="1247654" algn="l" defTabSz="1247654" rtl="0" eaLnBrk="1" latinLnBrk="0" hangingPunct="1">
+      <a:defRPr sz="2456" kern="1200">
         <a:solidFill>
           <a:schemeClr val="tx1"/>
         </a:solidFill>
@@ -43,8 +43,8 @@
         <a:cs typeface="+mn-cs"/>
       </a:defRPr>
     </a:lvl3pPr>
-    <a:lvl4pPr marL="511236" algn="l" defTabSz="340824" rtl="0" eaLnBrk="1" latinLnBrk="0" hangingPunct="1">
-      <a:defRPr sz="671" kern="1200">
+    <a:lvl4pPr marL="1871482" algn="l" defTabSz="1247654" rtl="0" eaLnBrk="1" latinLnBrk="0" hangingPunct="1">
+      <a:defRPr sz="2456" kern="1200">
         <a:solidFill>
           <a:schemeClr val="tx1"/>
         </a:solidFill>
@@ -53,8 +53,8 @@
         <a:cs typeface="+mn-cs"/>
       </a:defRPr>
     </a:lvl4pPr>
-    <a:lvl5pPr marL="681647" algn="l" defTabSz="340824" rtl="0" eaLnBrk="1" latinLnBrk="0" hangingPunct="1">
-      <a:defRPr sz="671" kern="1200">
+    <a:lvl5pPr marL="2495305" algn="l" defTabSz="1247654" rtl="0" eaLnBrk="1" latinLnBrk="0" hangingPunct="1">
+      <a:defRPr sz="2456" kern="1200">
         <a:solidFill>
           <a:schemeClr val="tx1"/>
         </a:solidFill>
@@ -63,8 +63,8 @@
         <a:cs typeface="+mn-cs"/>
       </a:defRPr>
     </a:lvl5pPr>
-    <a:lvl6pPr marL="852060" algn="l" defTabSz="340824" rtl="0" eaLnBrk="1" latinLnBrk="0" hangingPunct="1">
-      <a:defRPr sz="671" kern="1200">
+    <a:lvl6pPr marL="3119136" algn="l" defTabSz="1247654" rtl="0" eaLnBrk="1" latinLnBrk="0" hangingPunct="1">
+      <a:defRPr sz="2456" kern="1200">
         <a:solidFill>
           <a:schemeClr val="tx1"/>
         </a:solidFill>
@@ -73,8 +73,8 @@
         <a:cs typeface="+mn-cs"/>
       </a:defRPr>
     </a:lvl6pPr>
-    <a:lvl7pPr marL="1022471" algn="l" defTabSz="340824" rtl="0" eaLnBrk="1" latinLnBrk="0" hangingPunct="1">
-      <a:defRPr sz="671" kern="1200">
+    <a:lvl7pPr marL="3742960" algn="l" defTabSz="1247654" rtl="0" eaLnBrk="1" latinLnBrk="0" hangingPunct="1">
+      <a:defRPr sz="2456" kern="1200">
         <a:solidFill>
           <a:schemeClr val="tx1"/>
         </a:solidFill>
@@ -83,8 +83,8 @@
         <a:cs typeface="+mn-cs"/>
       </a:defRPr>
     </a:lvl7pPr>
-    <a:lvl8pPr marL="1192883" algn="l" defTabSz="340824" rtl="0" eaLnBrk="1" latinLnBrk="0" hangingPunct="1">
-      <a:defRPr sz="671" kern="1200">
+    <a:lvl8pPr marL="4366787" algn="l" defTabSz="1247654" rtl="0" eaLnBrk="1" latinLnBrk="0" hangingPunct="1">
+      <a:defRPr sz="2456" kern="1200">
         <a:solidFill>
           <a:schemeClr val="tx1"/>
         </a:solidFill>
@@ -93,8 +93,8 @@
         <a:cs typeface="+mn-cs"/>
       </a:defRPr>
     </a:lvl8pPr>
-    <a:lvl9pPr marL="1363295" algn="l" defTabSz="340824" rtl="0" eaLnBrk="1" latinLnBrk="0" hangingPunct="1">
-      <a:defRPr sz="671" kern="1200">
+    <a:lvl9pPr marL="4990614" algn="l" defTabSz="1247654" rtl="0" eaLnBrk="1" latinLnBrk="0" hangingPunct="1">
+      <a:defRPr sz="2456" kern="1200">
         <a:solidFill>
           <a:schemeClr val="tx1"/>
         </a:solidFill>
@@ -104,6 +104,11 @@
       </a:defRPr>
     </a:lvl9pPr>
   </p:defaultTextStyle>
+  <p:extLst>
+    <p:ext uri="{EFAFB233-063F-42B5-8137-9DF3F51BA10A}">
+      <p15:sldGuideLst xmlns:p15="http://schemas.microsoft.com/office/powerpoint/2012/main"/>
+    </p:ext>
+  </p:extLst>
 </p:presentation>
 </file>
 
@@ -136,15 +141,15 @@
         </p:nvSpPr>
         <p:spPr>
           <a:xfrm>
-            <a:off x="304443" y="498308"/>
-            <a:ext cx="3450352" cy="1060050"/>
+            <a:off x="975241" y="2128073"/>
+            <a:ext cx="11052731" cy="4527045"/>
           </a:xfrm>
         </p:spPr>
         <p:txBody>
           <a:bodyPr anchor="b"/>
           <a:lstStyle>
             <a:lvl1pPr algn="ctr">
-              <a:defRPr sz="2663"/>
+              <a:defRPr sz="8532"/>
             </a:lvl1pPr>
           </a:lstStyle>
           <a:p>
@@ -168,8 +173,8 @@
         </p:nvSpPr>
         <p:spPr>
           <a:xfrm>
-            <a:off x="507405" y="1599238"/>
-            <a:ext cx="3044429" cy="735128"/>
+            <a:off x="1625402" y="6829698"/>
+            <a:ext cx="9752410" cy="3139432"/>
           </a:xfrm>
         </p:spPr>
         <p:txBody>
@@ -177,39 +182,39 @@
           <a:lstStyle>
             <a:lvl1pPr marL="0" indent="0" algn="ctr">
               <a:buNone/>
-              <a:defRPr sz="1065"/>
+              <a:defRPr sz="3413"/>
             </a:lvl1pPr>
-            <a:lvl2pPr marL="202951" indent="0" algn="ctr">
-              <a:buNone/>
-              <a:defRPr sz="888"/>
+            <a:lvl2pPr marL="650138" indent="0" algn="ctr">
+              <a:buNone/>
+              <a:defRPr sz="2844"/>
             </a:lvl2pPr>
-            <a:lvl3pPr marL="405902" indent="0" algn="ctr">
-              <a:buNone/>
-              <a:defRPr sz="799"/>
+            <a:lvl3pPr marL="1300277" indent="0" algn="ctr">
+              <a:buNone/>
+              <a:defRPr sz="2560"/>
             </a:lvl3pPr>
-            <a:lvl4pPr marL="608853" indent="0" algn="ctr">
-              <a:buNone/>
-              <a:defRPr sz="710"/>
+            <a:lvl4pPr marL="1950415" indent="0" algn="ctr">
+              <a:buNone/>
+              <a:defRPr sz="2275"/>
             </a:lvl4pPr>
-            <a:lvl5pPr marL="811804" indent="0" algn="ctr">
-              <a:buNone/>
-              <a:defRPr sz="710"/>
+            <a:lvl5pPr marL="2600554" indent="0" algn="ctr">
+              <a:buNone/>
+              <a:defRPr sz="2275"/>
             </a:lvl5pPr>
-            <a:lvl6pPr marL="1014755" indent="0" algn="ctr">
-              <a:buNone/>
-              <a:defRPr sz="710"/>
+            <a:lvl6pPr marL="3250692" indent="0" algn="ctr">
+              <a:buNone/>
+              <a:defRPr sz="2275"/>
             </a:lvl6pPr>
-            <a:lvl7pPr marL="1217706" indent="0" algn="ctr">
-              <a:buNone/>
-              <a:defRPr sz="710"/>
+            <a:lvl7pPr marL="3900830" indent="0" algn="ctr">
+              <a:buNone/>
+              <a:defRPr sz="2275"/>
             </a:lvl7pPr>
-            <a:lvl8pPr marL="1420658" indent="0" algn="ctr">
-              <a:buNone/>
-              <a:defRPr sz="710"/>
+            <a:lvl8pPr marL="4550969" indent="0" algn="ctr">
+              <a:buNone/>
+              <a:defRPr sz="2275"/>
             </a:lvl8pPr>
-            <a:lvl9pPr marL="1623609" indent="0" algn="ctr">
-              <a:buNone/>
-              <a:defRPr sz="710"/>
+            <a:lvl9pPr marL="5201107" indent="0" algn="ctr">
+              <a:buNone/>
+              <a:defRPr sz="2275"/>
             </a:lvl9pPr>
           </a:lstStyle>
           <a:p>
@@ -238,7 +243,7 @@
           <a:p>
             <a:fld id="{A116F196-486B-8D41-9A8F-907DE817D5B1}" type="datetimeFigureOut">
               <a:rPr lang="en-US" smtClean="0"/>
-              <a:t>6/4/18</a:t>
+              <a:t>6/6/18</a:t>
             </a:fld>
             <a:endParaRPr lang="en-US"/>
           </a:p>
@@ -289,7 +294,7 @@
     </p:spTree>
     <p:extLst>
       <p:ext uri="{BB962C8B-B14F-4D97-AF65-F5344CB8AC3E}">
-        <p14:creationId xmlns:p14="http://schemas.microsoft.com/office/powerpoint/2010/main" val="3753195825"/>
+        <p14:creationId xmlns:p14="http://schemas.microsoft.com/office/powerpoint/2010/main" val="398586631"/>
       </p:ext>
     </p:extLst>
   </p:cSld>
@@ -408,7 +413,7 @@
           <a:p>
             <a:fld id="{A116F196-486B-8D41-9A8F-907DE817D5B1}" type="datetimeFigureOut">
               <a:rPr lang="en-US" smtClean="0"/>
-              <a:t>6/4/18</a:t>
+              <a:t>6/6/18</a:t>
             </a:fld>
             <a:endParaRPr lang="en-US"/>
           </a:p>
@@ -459,7 +464,7 @@
     </p:spTree>
     <p:extLst>
       <p:ext uri="{BB962C8B-B14F-4D97-AF65-F5344CB8AC3E}">
-        <p14:creationId xmlns:p14="http://schemas.microsoft.com/office/powerpoint/2010/main" val="709556116"/>
+        <p14:creationId xmlns:p14="http://schemas.microsoft.com/office/powerpoint/2010/main" val="565908033"/>
       </p:ext>
     </p:extLst>
   </p:cSld>
@@ -498,8 +503,8 @@
         </p:nvSpPr>
         <p:spPr>
           <a:xfrm>
-            <a:off x="2904893" y="162109"/>
-            <a:ext cx="875273" cy="2580348"/>
+            <a:off x="9305425" y="692301"/>
+            <a:ext cx="2803818" cy="11019622"/>
           </a:xfrm>
         </p:spPr>
         <p:txBody>
@@ -526,8 +531,8 @@
         </p:nvSpPr>
         <p:spPr>
           <a:xfrm>
-            <a:off x="279073" y="162109"/>
-            <a:ext cx="2575079" cy="2580348"/>
+            <a:off x="893972" y="692301"/>
+            <a:ext cx="8248913" cy="11019622"/>
           </a:xfrm>
         </p:spPr>
         <p:txBody>
@@ -588,7 +593,7 @@
           <a:p>
             <a:fld id="{A116F196-486B-8D41-9A8F-907DE817D5B1}" type="datetimeFigureOut">
               <a:rPr lang="en-US" smtClean="0"/>
-              <a:t>6/4/18</a:t>
+              <a:t>6/6/18</a:t>
             </a:fld>
             <a:endParaRPr lang="en-US"/>
           </a:p>
@@ -639,7 +644,7 @@
     </p:spTree>
     <p:extLst>
       <p:ext uri="{BB962C8B-B14F-4D97-AF65-F5344CB8AC3E}">
-        <p14:creationId xmlns:p14="http://schemas.microsoft.com/office/powerpoint/2010/main" val="2851634675"/>
+        <p14:creationId xmlns:p14="http://schemas.microsoft.com/office/powerpoint/2010/main" val="3121705164"/>
       </p:ext>
     </p:extLst>
   </p:cSld>
@@ -758,7 +763,7 @@
           <a:p>
             <a:fld id="{A116F196-486B-8D41-9A8F-907DE817D5B1}" type="datetimeFigureOut">
               <a:rPr lang="en-US" smtClean="0"/>
-              <a:t>6/4/18</a:t>
+              <a:t>6/6/18</a:t>
             </a:fld>
             <a:endParaRPr lang="en-US"/>
           </a:p>
@@ -809,7 +814,7 @@
     </p:spTree>
     <p:extLst>
       <p:ext uri="{BB962C8B-B14F-4D97-AF65-F5344CB8AC3E}">
-        <p14:creationId xmlns:p14="http://schemas.microsoft.com/office/powerpoint/2010/main" val="2531334465"/>
+        <p14:creationId xmlns:p14="http://schemas.microsoft.com/office/powerpoint/2010/main" val="4014404346"/>
       </p:ext>
     </p:extLst>
   </p:cSld>
@@ -848,15 +853,15 @@
         </p:nvSpPr>
         <p:spPr>
           <a:xfrm>
-            <a:off x="276959" y="759093"/>
-            <a:ext cx="3501093" cy="1266562"/>
+            <a:off x="887199" y="3241777"/>
+            <a:ext cx="11215271" cy="5408974"/>
           </a:xfrm>
         </p:spPr>
         <p:txBody>
           <a:bodyPr anchor="b"/>
           <a:lstStyle>
             <a:lvl1pPr>
-              <a:defRPr sz="2663"/>
+              <a:defRPr sz="8532"/>
             </a:lvl1pPr>
           </a:lstStyle>
           <a:p>
@@ -880,8 +885,8 @@
         </p:nvSpPr>
         <p:spPr>
           <a:xfrm>
-            <a:off x="276959" y="2037637"/>
-            <a:ext cx="3501093" cy="666055"/>
+            <a:off x="887199" y="8701922"/>
+            <a:ext cx="11215271" cy="2844452"/>
           </a:xfrm>
         </p:spPr>
         <p:txBody>
@@ -889,15 +894,15 @@
           <a:lstStyle>
             <a:lvl1pPr marL="0" indent="0">
               <a:buNone/>
-              <a:defRPr sz="1065">
+              <a:defRPr sz="3413">
                 <a:solidFill>
                   <a:schemeClr val="tx1"/>
                 </a:solidFill>
               </a:defRPr>
             </a:lvl1pPr>
-            <a:lvl2pPr marL="202951" indent="0">
-              <a:buNone/>
-              <a:defRPr sz="888">
+            <a:lvl2pPr marL="650138" indent="0">
+              <a:buNone/>
+              <a:defRPr sz="2844">
                 <a:solidFill>
                   <a:schemeClr val="tx1">
                     <a:tint val="75000"/>
@@ -905,9 +910,9 @@
                 </a:solidFill>
               </a:defRPr>
             </a:lvl2pPr>
-            <a:lvl3pPr marL="405902" indent="0">
-              <a:buNone/>
-              <a:defRPr sz="799">
+            <a:lvl3pPr marL="1300277" indent="0">
+              <a:buNone/>
+              <a:defRPr sz="2560">
                 <a:solidFill>
                   <a:schemeClr val="tx1">
                     <a:tint val="75000"/>
@@ -915,9 +920,9 @@
                 </a:solidFill>
               </a:defRPr>
             </a:lvl3pPr>
-            <a:lvl4pPr marL="608853" indent="0">
-              <a:buNone/>
-              <a:defRPr sz="710">
+            <a:lvl4pPr marL="1950415" indent="0">
+              <a:buNone/>
+              <a:defRPr sz="2275">
                 <a:solidFill>
                   <a:schemeClr val="tx1">
                     <a:tint val="75000"/>
@@ -925,9 +930,9 @@
                 </a:solidFill>
               </a:defRPr>
             </a:lvl4pPr>
-            <a:lvl5pPr marL="811804" indent="0">
-              <a:buNone/>
-              <a:defRPr sz="710">
+            <a:lvl5pPr marL="2600554" indent="0">
+              <a:buNone/>
+              <a:defRPr sz="2275">
                 <a:solidFill>
                   <a:schemeClr val="tx1">
                     <a:tint val="75000"/>
@@ -935,9 +940,9 @@
                 </a:solidFill>
               </a:defRPr>
             </a:lvl5pPr>
-            <a:lvl6pPr marL="1014755" indent="0">
-              <a:buNone/>
-              <a:defRPr sz="710">
+            <a:lvl6pPr marL="3250692" indent="0">
+              <a:buNone/>
+              <a:defRPr sz="2275">
                 <a:solidFill>
                   <a:schemeClr val="tx1">
                     <a:tint val="75000"/>
@@ -945,9 +950,9 @@
                 </a:solidFill>
               </a:defRPr>
             </a:lvl6pPr>
-            <a:lvl7pPr marL="1217706" indent="0">
-              <a:buNone/>
-              <a:defRPr sz="710">
+            <a:lvl7pPr marL="3900830" indent="0">
+              <a:buNone/>
+              <a:defRPr sz="2275">
                 <a:solidFill>
                   <a:schemeClr val="tx1">
                     <a:tint val="75000"/>
@@ -955,9 +960,9 @@
                 </a:solidFill>
               </a:defRPr>
             </a:lvl7pPr>
-            <a:lvl8pPr marL="1420658" indent="0">
-              <a:buNone/>
-              <a:defRPr sz="710">
+            <a:lvl8pPr marL="4550969" indent="0">
+              <a:buNone/>
+              <a:defRPr sz="2275">
                 <a:solidFill>
                   <a:schemeClr val="tx1">
                     <a:tint val="75000"/>
@@ -965,9 +970,9 @@
                 </a:solidFill>
               </a:defRPr>
             </a:lvl8pPr>
-            <a:lvl9pPr marL="1623609" indent="0">
-              <a:buNone/>
-              <a:defRPr sz="710">
+            <a:lvl9pPr marL="5201107" indent="0">
+              <a:buNone/>
+              <a:defRPr sz="2275">
                 <a:solidFill>
                   <a:schemeClr val="tx1">
                     <a:tint val="75000"/>
@@ -1002,7 +1007,7 @@
           <a:p>
             <a:fld id="{A116F196-486B-8D41-9A8F-907DE817D5B1}" type="datetimeFigureOut">
               <a:rPr lang="en-US" smtClean="0"/>
-              <a:t>6/4/18</a:t>
+              <a:t>6/6/18</a:t>
             </a:fld>
             <a:endParaRPr lang="en-US"/>
           </a:p>
@@ -1053,7 +1058,7 @@
     </p:spTree>
     <p:extLst>
       <p:ext uri="{BB962C8B-B14F-4D97-AF65-F5344CB8AC3E}">
-        <p14:creationId xmlns:p14="http://schemas.microsoft.com/office/powerpoint/2010/main" val="1040147434"/>
+        <p14:creationId xmlns:p14="http://schemas.microsoft.com/office/powerpoint/2010/main" val="2233536621"/>
       </p:ext>
     </p:extLst>
   </p:cSld>
@@ -1115,8 +1120,8 @@
         </p:nvSpPr>
         <p:spPr>
           <a:xfrm>
-            <a:off x="279073" y="810544"/>
-            <a:ext cx="1725176" cy="1931913"/>
+            <a:off x="893971" y="3461504"/>
+            <a:ext cx="5526366" cy="8250419"/>
           </a:xfrm>
         </p:spPr>
         <p:txBody>
@@ -1172,8 +1177,8 @@
         </p:nvSpPr>
         <p:spPr>
           <a:xfrm>
-            <a:off x="2054989" y="810544"/>
-            <a:ext cx="1725176" cy="1931913"/>
+            <a:off x="6582876" y="3461504"/>
+            <a:ext cx="5526366" cy="8250419"/>
           </a:xfrm>
         </p:spPr>
         <p:txBody>
@@ -1234,7 +1239,7 @@
           <a:p>
             <a:fld id="{A116F196-486B-8D41-9A8F-907DE817D5B1}" type="datetimeFigureOut">
               <a:rPr lang="en-US" smtClean="0"/>
-              <a:t>6/4/18</a:t>
+              <a:t>6/6/18</a:t>
             </a:fld>
             <a:endParaRPr lang="en-US"/>
           </a:p>
@@ -1285,7 +1290,7 @@
     </p:spTree>
     <p:extLst>
       <p:ext uri="{BB962C8B-B14F-4D97-AF65-F5344CB8AC3E}">
-        <p14:creationId xmlns:p14="http://schemas.microsoft.com/office/powerpoint/2010/main" val="2269469861"/>
+        <p14:creationId xmlns:p14="http://schemas.microsoft.com/office/powerpoint/2010/main" val="999638928"/>
       </p:ext>
     </p:extLst>
   </p:cSld>
@@ -1324,8 +1329,8 @@
         </p:nvSpPr>
         <p:spPr>
           <a:xfrm>
-            <a:off x="279601" y="162110"/>
-            <a:ext cx="3501093" cy="588525"/>
+            <a:off x="895665" y="692304"/>
+            <a:ext cx="11215271" cy="2513353"/>
           </a:xfrm>
         </p:spPr>
         <p:txBody>
@@ -1352,8 +1357,8 @@
         </p:nvSpPr>
         <p:spPr>
           <a:xfrm>
-            <a:off x="279602" y="746405"/>
-            <a:ext cx="1717248" cy="365802"/>
+            <a:off x="895666" y="3187594"/>
+            <a:ext cx="5500968" cy="1562191"/>
           </a:xfrm>
         </p:spPr>
         <p:txBody>
@@ -1361,39 +1366,39 @@
           <a:lstStyle>
             <a:lvl1pPr marL="0" indent="0">
               <a:buNone/>
-              <a:defRPr sz="1065" b="1"/>
+              <a:defRPr sz="3413" b="1"/>
             </a:lvl1pPr>
-            <a:lvl2pPr marL="202951" indent="0">
-              <a:buNone/>
-              <a:defRPr sz="888" b="1"/>
+            <a:lvl2pPr marL="650138" indent="0">
+              <a:buNone/>
+              <a:defRPr sz="2844" b="1"/>
             </a:lvl2pPr>
-            <a:lvl3pPr marL="405902" indent="0">
-              <a:buNone/>
-              <a:defRPr sz="799" b="1"/>
+            <a:lvl3pPr marL="1300277" indent="0">
+              <a:buNone/>
+              <a:defRPr sz="2560" b="1"/>
             </a:lvl3pPr>
-            <a:lvl4pPr marL="608853" indent="0">
-              <a:buNone/>
-              <a:defRPr sz="710" b="1"/>
+            <a:lvl4pPr marL="1950415" indent="0">
+              <a:buNone/>
+              <a:defRPr sz="2275" b="1"/>
             </a:lvl4pPr>
-            <a:lvl5pPr marL="811804" indent="0">
-              <a:buNone/>
-              <a:defRPr sz="710" b="1"/>
+            <a:lvl5pPr marL="2600554" indent="0">
+              <a:buNone/>
+              <a:defRPr sz="2275" b="1"/>
             </a:lvl5pPr>
-            <a:lvl6pPr marL="1014755" indent="0">
-              <a:buNone/>
-              <a:defRPr sz="710" b="1"/>
+            <a:lvl6pPr marL="3250692" indent="0">
+              <a:buNone/>
+              <a:defRPr sz="2275" b="1"/>
             </a:lvl6pPr>
-            <a:lvl7pPr marL="1217706" indent="0">
-              <a:buNone/>
-              <a:defRPr sz="710" b="1"/>
+            <a:lvl7pPr marL="3900830" indent="0">
+              <a:buNone/>
+              <a:defRPr sz="2275" b="1"/>
             </a:lvl7pPr>
-            <a:lvl8pPr marL="1420658" indent="0">
-              <a:buNone/>
-              <a:defRPr sz="710" b="1"/>
+            <a:lvl8pPr marL="4550969" indent="0">
+              <a:buNone/>
+              <a:defRPr sz="2275" b="1"/>
             </a:lvl8pPr>
-            <a:lvl9pPr marL="1623609" indent="0">
-              <a:buNone/>
-              <a:defRPr sz="710" b="1"/>
+            <a:lvl9pPr marL="5201107" indent="0">
+              <a:buNone/>
+              <a:defRPr sz="2275" b="1"/>
             </a:lvl9pPr>
           </a:lstStyle>
           <a:p>
@@ -1417,8 +1422,8 @@
         </p:nvSpPr>
         <p:spPr>
           <a:xfrm>
-            <a:off x="279602" y="1112207"/>
-            <a:ext cx="1717248" cy="1635889"/>
+            <a:off x="895666" y="4749785"/>
+            <a:ext cx="5500968" cy="6986218"/>
           </a:xfrm>
         </p:spPr>
         <p:txBody>
@@ -1474,8 +1479,8 @@
         </p:nvSpPr>
         <p:spPr>
           <a:xfrm>
-            <a:off x="2054989" y="746405"/>
-            <a:ext cx="1725705" cy="365802"/>
+            <a:off x="6582877" y="3187594"/>
+            <a:ext cx="5528059" cy="1562191"/>
           </a:xfrm>
         </p:spPr>
         <p:txBody>
@@ -1483,39 +1488,39 @@
           <a:lstStyle>
             <a:lvl1pPr marL="0" indent="0">
               <a:buNone/>
-              <a:defRPr sz="1065" b="1"/>
+              <a:defRPr sz="3413" b="1"/>
             </a:lvl1pPr>
-            <a:lvl2pPr marL="202951" indent="0">
-              <a:buNone/>
-              <a:defRPr sz="888" b="1"/>
+            <a:lvl2pPr marL="650138" indent="0">
+              <a:buNone/>
+              <a:defRPr sz="2844" b="1"/>
             </a:lvl2pPr>
-            <a:lvl3pPr marL="405902" indent="0">
-              <a:buNone/>
-              <a:defRPr sz="799" b="1"/>
+            <a:lvl3pPr marL="1300277" indent="0">
+              <a:buNone/>
+              <a:defRPr sz="2560" b="1"/>
             </a:lvl3pPr>
-            <a:lvl4pPr marL="608853" indent="0">
-              <a:buNone/>
-              <a:defRPr sz="710" b="1"/>
+            <a:lvl4pPr marL="1950415" indent="0">
+              <a:buNone/>
+              <a:defRPr sz="2275" b="1"/>
             </a:lvl4pPr>
-            <a:lvl5pPr marL="811804" indent="0">
-              <a:buNone/>
-              <a:defRPr sz="710" b="1"/>
+            <a:lvl5pPr marL="2600554" indent="0">
+              <a:buNone/>
+              <a:defRPr sz="2275" b="1"/>
             </a:lvl5pPr>
-            <a:lvl6pPr marL="1014755" indent="0">
-              <a:buNone/>
-              <a:defRPr sz="710" b="1"/>
+            <a:lvl6pPr marL="3250692" indent="0">
+              <a:buNone/>
+              <a:defRPr sz="2275" b="1"/>
             </a:lvl6pPr>
-            <a:lvl7pPr marL="1217706" indent="0">
-              <a:buNone/>
-              <a:defRPr sz="710" b="1"/>
+            <a:lvl7pPr marL="3900830" indent="0">
+              <a:buNone/>
+              <a:defRPr sz="2275" b="1"/>
             </a:lvl7pPr>
-            <a:lvl8pPr marL="1420658" indent="0">
-              <a:buNone/>
-              <a:defRPr sz="710" b="1"/>
+            <a:lvl8pPr marL="4550969" indent="0">
+              <a:buNone/>
+              <a:defRPr sz="2275" b="1"/>
             </a:lvl8pPr>
-            <a:lvl9pPr marL="1623609" indent="0">
-              <a:buNone/>
-              <a:defRPr sz="710" b="1"/>
+            <a:lvl9pPr marL="5201107" indent="0">
+              <a:buNone/>
+              <a:defRPr sz="2275" b="1"/>
             </a:lvl9pPr>
           </a:lstStyle>
           <a:p>
@@ -1539,8 +1544,8 @@
         </p:nvSpPr>
         <p:spPr>
           <a:xfrm>
-            <a:off x="2054989" y="1112207"/>
-            <a:ext cx="1725705" cy="1635889"/>
+            <a:off x="6582877" y="4749785"/>
+            <a:ext cx="5528059" cy="6986218"/>
           </a:xfrm>
         </p:spPr>
         <p:txBody>
@@ -1601,7 +1606,7 @@
           <a:p>
             <a:fld id="{A116F196-486B-8D41-9A8F-907DE817D5B1}" type="datetimeFigureOut">
               <a:rPr lang="en-US" smtClean="0"/>
-              <a:t>6/4/18</a:t>
+              <a:t>6/6/18</a:t>
             </a:fld>
             <a:endParaRPr lang="en-US"/>
           </a:p>
@@ -1652,7 +1657,7 @@
     </p:spTree>
     <p:extLst>
       <p:ext uri="{BB962C8B-B14F-4D97-AF65-F5344CB8AC3E}">
-        <p14:creationId xmlns:p14="http://schemas.microsoft.com/office/powerpoint/2010/main" val="3022565486"/>
+        <p14:creationId xmlns:p14="http://schemas.microsoft.com/office/powerpoint/2010/main" val="55564479"/>
       </p:ext>
     </p:extLst>
   </p:cSld>
@@ -1719,7 +1724,7 @@
           <a:p>
             <a:fld id="{A116F196-486B-8D41-9A8F-907DE817D5B1}" type="datetimeFigureOut">
               <a:rPr lang="en-US" smtClean="0"/>
-              <a:t>6/4/18</a:t>
+              <a:t>6/6/18</a:t>
             </a:fld>
             <a:endParaRPr lang="en-US"/>
           </a:p>
@@ -1770,7 +1775,7 @@
     </p:spTree>
     <p:extLst>
       <p:ext uri="{BB962C8B-B14F-4D97-AF65-F5344CB8AC3E}">
-        <p14:creationId xmlns:p14="http://schemas.microsoft.com/office/powerpoint/2010/main" val="3348217925"/>
+        <p14:creationId xmlns:p14="http://schemas.microsoft.com/office/powerpoint/2010/main" val="2652836596"/>
       </p:ext>
     </p:extLst>
   </p:cSld>
@@ -1814,7 +1819,7 @@
           <a:p>
             <a:fld id="{A116F196-486B-8D41-9A8F-907DE817D5B1}" type="datetimeFigureOut">
               <a:rPr lang="en-US" smtClean="0"/>
-              <a:t>6/4/18</a:t>
+              <a:t>6/6/18</a:t>
             </a:fld>
             <a:endParaRPr lang="en-US"/>
           </a:p>
@@ -1865,7 +1870,7 @@
     </p:spTree>
     <p:extLst>
       <p:ext uri="{BB962C8B-B14F-4D97-AF65-F5344CB8AC3E}">
-        <p14:creationId xmlns:p14="http://schemas.microsoft.com/office/powerpoint/2010/main" val="1715885292"/>
+        <p14:creationId xmlns:p14="http://schemas.microsoft.com/office/powerpoint/2010/main" val="3434815188"/>
       </p:ext>
     </p:extLst>
   </p:cSld>
@@ -1904,15 +1909,15 @@
         </p:nvSpPr>
         <p:spPr>
           <a:xfrm>
-            <a:off x="279601" y="202988"/>
-            <a:ext cx="1309210" cy="710459"/>
+            <a:off x="895664" y="866881"/>
+            <a:ext cx="4193875" cy="3034083"/>
           </a:xfrm>
         </p:spPr>
         <p:txBody>
           <a:bodyPr anchor="b"/>
           <a:lstStyle>
             <a:lvl1pPr>
-              <a:defRPr sz="1420"/>
+              <a:defRPr sz="4550"/>
             </a:lvl1pPr>
           </a:lstStyle>
           <a:p>
@@ -1936,39 +1941,39 @@
         </p:nvSpPr>
         <p:spPr>
           <a:xfrm>
-            <a:off x="1725705" y="438399"/>
-            <a:ext cx="2054989" cy="2163799"/>
+            <a:off x="5528059" y="1872225"/>
+            <a:ext cx="6582877" cy="9240709"/>
           </a:xfrm>
         </p:spPr>
         <p:txBody>
           <a:bodyPr/>
           <a:lstStyle>
             <a:lvl1pPr>
-              <a:defRPr sz="1420"/>
+              <a:defRPr sz="4550"/>
             </a:lvl1pPr>
             <a:lvl2pPr>
-              <a:defRPr sz="1243"/>
+              <a:defRPr sz="3982"/>
             </a:lvl2pPr>
             <a:lvl3pPr>
-              <a:defRPr sz="1065"/>
+              <a:defRPr sz="3413"/>
             </a:lvl3pPr>
             <a:lvl4pPr>
-              <a:defRPr sz="888"/>
+              <a:defRPr sz="2844"/>
             </a:lvl4pPr>
             <a:lvl5pPr>
-              <a:defRPr sz="888"/>
+              <a:defRPr sz="2844"/>
             </a:lvl5pPr>
             <a:lvl6pPr>
-              <a:defRPr sz="888"/>
+              <a:defRPr sz="2844"/>
             </a:lvl6pPr>
             <a:lvl7pPr>
-              <a:defRPr sz="888"/>
+              <a:defRPr sz="2844"/>
             </a:lvl7pPr>
             <a:lvl8pPr>
-              <a:defRPr sz="888"/>
+              <a:defRPr sz="2844"/>
             </a:lvl8pPr>
             <a:lvl9pPr>
-              <a:defRPr sz="888"/>
+              <a:defRPr sz="2844"/>
             </a:lvl9pPr>
           </a:lstStyle>
           <a:p>
@@ -2021,8 +2026,8 @@
         </p:nvSpPr>
         <p:spPr>
           <a:xfrm>
-            <a:off x="279601" y="913448"/>
-            <a:ext cx="1309210" cy="1692274"/>
+            <a:off x="895664" y="3900964"/>
+            <a:ext cx="4193875" cy="7227018"/>
           </a:xfrm>
         </p:spPr>
         <p:txBody>
@@ -2030,39 +2035,39 @@
           <a:lstStyle>
             <a:lvl1pPr marL="0" indent="0">
               <a:buNone/>
-              <a:defRPr sz="710"/>
+              <a:defRPr sz="2275"/>
             </a:lvl1pPr>
-            <a:lvl2pPr marL="202951" indent="0">
-              <a:buNone/>
-              <a:defRPr sz="621"/>
+            <a:lvl2pPr marL="650138" indent="0">
+              <a:buNone/>
+              <a:defRPr sz="1991"/>
             </a:lvl2pPr>
-            <a:lvl3pPr marL="405902" indent="0">
-              <a:buNone/>
-              <a:defRPr sz="533"/>
+            <a:lvl3pPr marL="1300277" indent="0">
+              <a:buNone/>
+              <a:defRPr sz="1706"/>
             </a:lvl3pPr>
-            <a:lvl4pPr marL="608853" indent="0">
-              <a:buNone/>
-              <a:defRPr sz="444"/>
+            <a:lvl4pPr marL="1950415" indent="0">
+              <a:buNone/>
+              <a:defRPr sz="1422"/>
             </a:lvl4pPr>
-            <a:lvl5pPr marL="811804" indent="0">
-              <a:buNone/>
-              <a:defRPr sz="444"/>
+            <a:lvl5pPr marL="2600554" indent="0">
+              <a:buNone/>
+              <a:defRPr sz="1422"/>
             </a:lvl5pPr>
-            <a:lvl6pPr marL="1014755" indent="0">
-              <a:buNone/>
-              <a:defRPr sz="444"/>
+            <a:lvl6pPr marL="3250692" indent="0">
+              <a:buNone/>
+              <a:defRPr sz="1422"/>
             </a:lvl6pPr>
-            <a:lvl7pPr marL="1217706" indent="0">
-              <a:buNone/>
-              <a:defRPr sz="444"/>
+            <a:lvl7pPr marL="3900830" indent="0">
+              <a:buNone/>
+              <a:defRPr sz="1422"/>
             </a:lvl7pPr>
-            <a:lvl8pPr marL="1420658" indent="0">
-              <a:buNone/>
-              <a:defRPr sz="444"/>
+            <a:lvl8pPr marL="4550969" indent="0">
+              <a:buNone/>
+              <a:defRPr sz="1422"/>
             </a:lvl8pPr>
-            <a:lvl9pPr marL="1623609" indent="0">
-              <a:buNone/>
-              <a:defRPr sz="444"/>
+            <a:lvl9pPr marL="5201107" indent="0">
+              <a:buNone/>
+              <a:defRPr sz="1422"/>
             </a:lvl9pPr>
           </a:lstStyle>
           <a:p>
@@ -2091,7 +2096,7 @@
           <a:p>
             <a:fld id="{A116F196-486B-8D41-9A8F-907DE817D5B1}" type="datetimeFigureOut">
               <a:rPr lang="en-US" smtClean="0"/>
-              <a:t>6/4/18</a:t>
+              <a:t>6/6/18</a:t>
             </a:fld>
             <a:endParaRPr lang="en-US"/>
           </a:p>
@@ -2142,7 +2147,7 @@
     </p:spTree>
     <p:extLst>
       <p:ext uri="{BB962C8B-B14F-4D97-AF65-F5344CB8AC3E}">
-        <p14:creationId xmlns:p14="http://schemas.microsoft.com/office/powerpoint/2010/main" val="1480653140"/>
+        <p14:creationId xmlns:p14="http://schemas.microsoft.com/office/powerpoint/2010/main" val="2673756379"/>
       </p:ext>
     </p:extLst>
   </p:cSld>
@@ -2181,15 +2186,15 @@
         </p:nvSpPr>
         <p:spPr>
           <a:xfrm>
-            <a:off x="279601" y="202988"/>
-            <a:ext cx="1309210" cy="710459"/>
+            <a:off x="895664" y="866881"/>
+            <a:ext cx="4193875" cy="3034083"/>
           </a:xfrm>
         </p:spPr>
         <p:txBody>
           <a:bodyPr anchor="b"/>
           <a:lstStyle>
             <a:lvl1pPr>
-              <a:defRPr sz="1420"/>
+              <a:defRPr sz="4550"/>
             </a:lvl1pPr>
           </a:lstStyle>
           <a:p>
@@ -2213,8 +2218,8 @@
         </p:nvSpPr>
         <p:spPr>
           <a:xfrm>
-            <a:off x="1725705" y="438399"/>
-            <a:ext cx="2054989" cy="2163799"/>
+            <a:off x="5528059" y="1872225"/>
+            <a:ext cx="6582877" cy="9240709"/>
           </a:xfrm>
         </p:spPr>
         <p:txBody>
@@ -2222,39 +2227,39 @@
           <a:lstStyle>
             <a:lvl1pPr marL="0" indent="0">
               <a:buNone/>
-              <a:defRPr sz="1420"/>
+              <a:defRPr sz="4550"/>
             </a:lvl1pPr>
-            <a:lvl2pPr marL="202951" indent="0">
-              <a:buNone/>
-              <a:defRPr sz="1243"/>
+            <a:lvl2pPr marL="650138" indent="0">
+              <a:buNone/>
+              <a:defRPr sz="3982"/>
             </a:lvl2pPr>
-            <a:lvl3pPr marL="405902" indent="0">
-              <a:buNone/>
-              <a:defRPr sz="1065"/>
+            <a:lvl3pPr marL="1300277" indent="0">
+              <a:buNone/>
+              <a:defRPr sz="3413"/>
             </a:lvl3pPr>
-            <a:lvl4pPr marL="608853" indent="0">
-              <a:buNone/>
-              <a:defRPr sz="888"/>
+            <a:lvl4pPr marL="1950415" indent="0">
+              <a:buNone/>
+              <a:defRPr sz="2844"/>
             </a:lvl4pPr>
-            <a:lvl5pPr marL="811804" indent="0">
-              <a:buNone/>
-              <a:defRPr sz="888"/>
+            <a:lvl5pPr marL="2600554" indent="0">
+              <a:buNone/>
+              <a:defRPr sz="2844"/>
             </a:lvl5pPr>
-            <a:lvl6pPr marL="1014755" indent="0">
-              <a:buNone/>
-              <a:defRPr sz="888"/>
+            <a:lvl6pPr marL="3250692" indent="0">
+              <a:buNone/>
+              <a:defRPr sz="2844"/>
             </a:lvl6pPr>
-            <a:lvl7pPr marL="1217706" indent="0">
-              <a:buNone/>
-              <a:defRPr sz="888"/>
+            <a:lvl7pPr marL="3900830" indent="0">
+              <a:buNone/>
+              <a:defRPr sz="2844"/>
             </a:lvl7pPr>
-            <a:lvl8pPr marL="1420658" indent="0">
-              <a:buNone/>
-              <a:defRPr sz="888"/>
+            <a:lvl8pPr marL="4550969" indent="0">
+              <a:buNone/>
+              <a:defRPr sz="2844"/>
             </a:lvl8pPr>
-            <a:lvl9pPr marL="1623609" indent="0">
-              <a:buNone/>
-              <a:defRPr sz="888"/>
+            <a:lvl9pPr marL="5201107" indent="0">
+              <a:buNone/>
+              <a:defRPr sz="2844"/>
             </a:lvl9pPr>
           </a:lstStyle>
           <a:p>
@@ -2278,8 +2283,8 @@
         </p:nvSpPr>
         <p:spPr>
           <a:xfrm>
-            <a:off x="279601" y="913448"/>
-            <a:ext cx="1309210" cy="1692274"/>
+            <a:off x="895664" y="3900964"/>
+            <a:ext cx="4193875" cy="7227018"/>
           </a:xfrm>
         </p:spPr>
         <p:txBody>
@@ -2287,39 +2292,39 @@
           <a:lstStyle>
             <a:lvl1pPr marL="0" indent="0">
               <a:buNone/>
-              <a:defRPr sz="710"/>
+              <a:defRPr sz="2275"/>
             </a:lvl1pPr>
-            <a:lvl2pPr marL="202951" indent="0">
-              <a:buNone/>
-              <a:defRPr sz="621"/>
+            <a:lvl2pPr marL="650138" indent="0">
+              <a:buNone/>
+              <a:defRPr sz="1991"/>
             </a:lvl2pPr>
-            <a:lvl3pPr marL="405902" indent="0">
-              <a:buNone/>
-              <a:defRPr sz="533"/>
+            <a:lvl3pPr marL="1300277" indent="0">
+              <a:buNone/>
+              <a:defRPr sz="1706"/>
             </a:lvl3pPr>
-            <a:lvl4pPr marL="608853" indent="0">
-              <a:buNone/>
-              <a:defRPr sz="444"/>
+            <a:lvl4pPr marL="1950415" indent="0">
+              <a:buNone/>
+              <a:defRPr sz="1422"/>
             </a:lvl4pPr>
-            <a:lvl5pPr marL="811804" indent="0">
-              <a:buNone/>
-              <a:defRPr sz="444"/>
+            <a:lvl5pPr marL="2600554" indent="0">
+              <a:buNone/>
+              <a:defRPr sz="1422"/>
             </a:lvl5pPr>
-            <a:lvl6pPr marL="1014755" indent="0">
-              <a:buNone/>
-              <a:defRPr sz="444"/>
+            <a:lvl6pPr marL="3250692" indent="0">
+              <a:buNone/>
+              <a:defRPr sz="1422"/>
             </a:lvl6pPr>
-            <a:lvl7pPr marL="1217706" indent="0">
-              <a:buNone/>
-              <a:defRPr sz="444"/>
+            <a:lvl7pPr marL="3900830" indent="0">
+              <a:buNone/>
+              <a:defRPr sz="1422"/>
             </a:lvl7pPr>
-            <a:lvl8pPr marL="1420658" indent="0">
-              <a:buNone/>
-              <a:defRPr sz="444"/>
+            <a:lvl8pPr marL="4550969" indent="0">
+              <a:buNone/>
+              <a:defRPr sz="1422"/>
             </a:lvl8pPr>
-            <a:lvl9pPr marL="1623609" indent="0">
-              <a:buNone/>
-              <a:defRPr sz="444"/>
+            <a:lvl9pPr marL="5201107" indent="0">
+              <a:buNone/>
+              <a:defRPr sz="1422"/>
             </a:lvl9pPr>
           </a:lstStyle>
           <a:p>
@@ -2348,7 +2353,7 @@
           <a:p>
             <a:fld id="{A116F196-486B-8D41-9A8F-907DE817D5B1}" type="datetimeFigureOut">
               <a:rPr lang="en-US" smtClean="0"/>
-              <a:t>6/4/18</a:t>
+              <a:t>6/6/18</a:t>
             </a:fld>
             <a:endParaRPr lang="en-US"/>
           </a:p>
@@ -2399,7 +2404,7 @@
     </p:spTree>
     <p:extLst>
       <p:ext uri="{BB962C8B-B14F-4D97-AF65-F5344CB8AC3E}">
-        <p14:creationId xmlns:p14="http://schemas.microsoft.com/office/powerpoint/2010/main" val="566218706"/>
+        <p14:creationId xmlns:p14="http://schemas.microsoft.com/office/powerpoint/2010/main" val="3712731634"/>
       </p:ext>
     </p:extLst>
   </p:cSld>
@@ -2443,8 +2448,8 @@
         </p:nvSpPr>
         <p:spPr>
           <a:xfrm>
-            <a:off x="279073" y="162110"/>
-            <a:ext cx="3501093" cy="588525"/>
+            <a:off x="893971" y="692304"/>
+            <a:ext cx="11215271" cy="2513353"/>
           </a:xfrm>
           <a:prstGeom prst="rect">
             <a:avLst/>
@@ -2476,8 +2481,8 @@
         </p:nvSpPr>
         <p:spPr>
           <a:xfrm>
-            <a:off x="279073" y="810544"/>
-            <a:ext cx="3501093" cy="1931913"/>
+            <a:off x="893971" y="3461504"/>
+            <a:ext cx="11215271" cy="8250419"/>
           </a:xfrm>
           <a:prstGeom prst="rect">
             <a:avLst/>
@@ -2538,8 +2543,8 @@
         </p:nvSpPr>
         <p:spPr>
           <a:xfrm>
-            <a:off x="279072" y="2822102"/>
-            <a:ext cx="913329" cy="162109"/>
+            <a:off x="893971" y="12052055"/>
+            <a:ext cx="2925723" cy="692301"/>
           </a:xfrm>
           <a:prstGeom prst="rect">
             <a:avLst/>
@@ -2549,7 +2554,7 @@
           <a:bodyPr vert="horz" lIns="91440" tIns="45720" rIns="91440" bIns="45720" rtlCol="0" anchor="ctr"/>
           <a:lstStyle>
             <a:lvl1pPr algn="l">
-              <a:defRPr sz="533">
+              <a:defRPr sz="1706">
                 <a:solidFill>
                   <a:schemeClr val="tx1">
                     <a:tint val="75000"/>
@@ -2561,7 +2566,7 @@
           <a:p>
             <a:fld id="{A116F196-486B-8D41-9A8F-907DE817D5B1}" type="datetimeFigureOut">
               <a:rPr lang="en-US" smtClean="0"/>
-              <a:t>6/4/18</a:t>
+              <a:t>6/6/18</a:t>
             </a:fld>
             <a:endParaRPr lang="en-US"/>
           </a:p>
@@ -2579,8 +2584,8 @@
         </p:nvSpPr>
         <p:spPr>
           <a:xfrm>
-            <a:off x="1344623" y="2822102"/>
-            <a:ext cx="1369993" cy="162109"/>
+            <a:off x="4307315" y="12052055"/>
+            <a:ext cx="4388584" cy="692301"/>
           </a:xfrm>
           <a:prstGeom prst="rect">
             <a:avLst/>
@@ -2590,7 +2595,7 @@
           <a:bodyPr vert="horz" lIns="91440" tIns="45720" rIns="91440" bIns="45720" rtlCol="0" anchor="ctr"/>
           <a:lstStyle>
             <a:lvl1pPr algn="ctr">
-              <a:defRPr sz="533">
+              <a:defRPr sz="1706">
                 <a:solidFill>
                   <a:schemeClr val="tx1">
                     <a:tint val="75000"/>
@@ -2616,8 +2621,8 @@
         </p:nvSpPr>
         <p:spPr>
           <a:xfrm>
-            <a:off x="2866837" y="2822102"/>
-            <a:ext cx="913329" cy="162109"/>
+            <a:off x="9183519" y="12052055"/>
+            <a:ext cx="2925723" cy="692301"/>
           </a:xfrm>
           <a:prstGeom prst="rect">
             <a:avLst/>
@@ -2627,7 +2632,7 @@
           <a:bodyPr vert="horz" lIns="91440" tIns="45720" rIns="91440" bIns="45720" rtlCol="0" anchor="ctr"/>
           <a:lstStyle>
             <a:lvl1pPr algn="r">
-              <a:defRPr sz="533">
+              <a:defRPr sz="1706">
                 <a:solidFill>
                   <a:schemeClr val="tx1">
                     <a:tint val="75000"/>
@@ -2648,27 +2653,27 @@
     </p:spTree>
     <p:extLst>
       <p:ext uri="{BB962C8B-B14F-4D97-AF65-F5344CB8AC3E}">
-        <p14:creationId xmlns:p14="http://schemas.microsoft.com/office/powerpoint/2010/main" val="2556328252"/>
+        <p14:creationId xmlns:p14="http://schemas.microsoft.com/office/powerpoint/2010/main" val="1872210965"/>
       </p:ext>
     </p:extLst>
   </p:cSld>
   <p:clrMap bg1="lt1" tx1="dk1" bg2="lt2" tx2="dk2" accent1="accent1" accent2="accent2" accent3="accent3" accent4="accent4" accent5="accent5" accent6="accent6" hlink="hlink" folHlink="folHlink"/>
   <p:sldLayoutIdLst>
-    <p:sldLayoutId id="2147483721" r:id="rId1"/>
-    <p:sldLayoutId id="2147483722" r:id="rId2"/>
-    <p:sldLayoutId id="2147483723" r:id="rId3"/>
-    <p:sldLayoutId id="2147483724" r:id="rId4"/>
-    <p:sldLayoutId id="2147483725" r:id="rId5"/>
-    <p:sldLayoutId id="2147483726" r:id="rId6"/>
-    <p:sldLayoutId id="2147483727" r:id="rId7"/>
-    <p:sldLayoutId id="2147483728" r:id="rId8"/>
-    <p:sldLayoutId id="2147483729" r:id="rId9"/>
-    <p:sldLayoutId id="2147483730" r:id="rId10"/>
-    <p:sldLayoutId id="2147483731" r:id="rId11"/>
+    <p:sldLayoutId id="2147483733" r:id="rId1"/>
+    <p:sldLayoutId id="2147483734" r:id="rId2"/>
+    <p:sldLayoutId id="2147483735" r:id="rId3"/>
+    <p:sldLayoutId id="2147483736" r:id="rId4"/>
+    <p:sldLayoutId id="2147483737" r:id="rId5"/>
+    <p:sldLayoutId id="2147483738" r:id="rId6"/>
+    <p:sldLayoutId id="2147483739" r:id="rId7"/>
+    <p:sldLayoutId id="2147483740" r:id="rId8"/>
+    <p:sldLayoutId id="2147483741" r:id="rId9"/>
+    <p:sldLayoutId id="2147483742" r:id="rId10"/>
+    <p:sldLayoutId id="2147483743" r:id="rId11"/>
   </p:sldLayoutIdLst>
   <p:txStyles>
     <p:titleStyle>
-      <a:lvl1pPr algn="l" defTabSz="405902" rtl="0" eaLnBrk="1" latinLnBrk="0" hangingPunct="1">
+      <a:lvl1pPr algn="l" defTabSz="1300277" rtl="0" eaLnBrk="1" latinLnBrk="0" hangingPunct="1">
         <a:lnSpc>
           <a:spcPct val="90000"/>
         </a:lnSpc>
@@ -2676,7 +2681,7 @@
           <a:spcPct val="0"/>
         </a:spcBef>
         <a:buNone/>
-        <a:defRPr sz="1953" kern="1200">
+        <a:defRPr sz="6257" kern="1200">
           <a:solidFill>
             <a:schemeClr val="tx1"/>
           </a:solidFill>
@@ -2687,16 +2692,16 @@
       </a:lvl1pPr>
     </p:titleStyle>
     <p:bodyStyle>
-      <a:lvl1pPr marL="101476" indent="-101476" algn="l" defTabSz="405902" rtl="0" eaLnBrk="1" latinLnBrk="0" hangingPunct="1">
+      <a:lvl1pPr marL="325069" indent="-325069" algn="l" defTabSz="1300277" rtl="0" eaLnBrk="1" latinLnBrk="0" hangingPunct="1">
         <a:lnSpc>
           <a:spcPct val="90000"/>
         </a:lnSpc>
         <a:spcBef>
-          <a:spcPts val="444"/>
+          <a:spcPts val="1422"/>
         </a:spcBef>
         <a:buFont typeface="Arial" panose="020B0604020202020204" pitchFamily="34" charset="0"/>
         <a:buChar char="•"/>
-        <a:defRPr sz="1243" kern="1200">
+        <a:defRPr sz="3982" kern="1200">
           <a:solidFill>
             <a:schemeClr val="tx1"/>
           </a:solidFill>
@@ -2705,16 +2710,16 @@
           <a:cs typeface="+mn-cs"/>
         </a:defRPr>
       </a:lvl1pPr>
-      <a:lvl2pPr marL="304427" indent="-101476" algn="l" defTabSz="405902" rtl="0" eaLnBrk="1" latinLnBrk="0" hangingPunct="1">
+      <a:lvl2pPr marL="975208" indent="-325069" algn="l" defTabSz="1300277" rtl="0" eaLnBrk="1" latinLnBrk="0" hangingPunct="1">
         <a:lnSpc>
           <a:spcPct val="90000"/>
         </a:lnSpc>
         <a:spcBef>
-          <a:spcPts val="222"/>
+          <a:spcPts val="711"/>
         </a:spcBef>
         <a:buFont typeface="Arial" panose="020B0604020202020204" pitchFamily="34" charset="0"/>
         <a:buChar char="•"/>
-        <a:defRPr sz="1065" kern="1200">
+        <a:defRPr sz="3413" kern="1200">
           <a:solidFill>
             <a:schemeClr val="tx1"/>
           </a:solidFill>
@@ -2723,16 +2728,16 @@
           <a:cs typeface="+mn-cs"/>
         </a:defRPr>
       </a:lvl2pPr>
-      <a:lvl3pPr marL="507378" indent="-101476" algn="l" defTabSz="405902" rtl="0" eaLnBrk="1" latinLnBrk="0" hangingPunct="1">
+      <a:lvl3pPr marL="1625346" indent="-325069" algn="l" defTabSz="1300277" rtl="0" eaLnBrk="1" latinLnBrk="0" hangingPunct="1">
         <a:lnSpc>
           <a:spcPct val="90000"/>
         </a:lnSpc>
         <a:spcBef>
-          <a:spcPts val="222"/>
+          <a:spcPts val="711"/>
         </a:spcBef>
         <a:buFont typeface="Arial" panose="020B0604020202020204" pitchFamily="34" charset="0"/>
         <a:buChar char="•"/>
-        <a:defRPr sz="888" kern="1200">
+        <a:defRPr sz="2844" kern="1200">
           <a:solidFill>
             <a:schemeClr val="tx1"/>
           </a:solidFill>
@@ -2741,16 +2746,16 @@
           <a:cs typeface="+mn-cs"/>
         </a:defRPr>
       </a:lvl3pPr>
-      <a:lvl4pPr marL="710329" indent="-101476" algn="l" defTabSz="405902" rtl="0" eaLnBrk="1" latinLnBrk="0" hangingPunct="1">
+      <a:lvl4pPr marL="2275484" indent="-325069" algn="l" defTabSz="1300277" rtl="0" eaLnBrk="1" latinLnBrk="0" hangingPunct="1">
         <a:lnSpc>
           <a:spcPct val="90000"/>
         </a:lnSpc>
         <a:spcBef>
-          <a:spcPts val="222"/>
+          <a:spcPts val="711"/>
         </a:spcBef>
         <a:buFont typeface="Arial" panose="020B0604020202020204" pitchFamily="34" charset="0"/>
         <a:buChar char="•"/>
-        <a:defRPr sz="799" kern="1200">
+        <a:defRPr sz="2560" kern="1200">
           <a:solidFill>
             <a:schemeClr val="tx1"/>
           </a:solidFill>
@@ -2759,16 +2764,16 @@
           <a:cs typeface="+mn-cs"/>
         </a:defRPr>
       </a:lvl4pPr>
-      <a:lvl5pPr marL="913280" indent="-101476" algn="l" defTabSz="405902" rtl="0" eaLnBrk="1" latinLnBrk="0" hangingPunct="1">
+      <a:lvl5pPr marL="2925623" indent="-325069" algn="l" defTabSz="1300277" rtl="0" eaLnBrk="1" latinLnBrk="0" hangingPunct="1">
         <a:lnSpc>
           <a:spcPct val="90000"/>
         </a:lnSpc>
         <a:spcBef>
-          <a:spcPts val="222"/>
+          <a:spcPts val="711"/>
         </a:spcBef>
         <a:buFont typeface="Arial" panose="020B0604020202020204" pitchFamily="34" charset="0"/>
         <a:buChar char="•"/>
-        <a:defRPr sz="799" kern="1200">
+        <a:defRPr sz="2560" kern="1200">
           <a:solidFill>
             <a:schemeClr val="tx1"/>
           </a:solidFill>
@@ -2777,16 +2782,16 @@
           <a:cs typeface="+mn-cs"/>
         </a:defRPr>
       </a:lvl5pPr>
-      <a:lvl6pPr marL="1116231" indent="-101476" algn="l" defTabSz="405902" rtl="0" eaLnBrk="1" latinLnBrk="0" hangingPunct="1">
+      <a:lvl6pPr marL="3575761" indent="-325069" algn="l" defTabSz="1300277" rtl="0" eaLnBrk="1" latinLnBrk="0" hangingPunct="1">
         <a:lnSpc>
           <a:spcPct val="90000"/>
         </a:lnSpc>
         <a:spcBef>
-          <a:spcPts val="222"/>
+          <a:spcPts val="711"/>
         </a:spcBef>
         <a:buFont typeface="Arial" panose="020B0604020202020204" pitchFamily="34" charset="0"/>
         <a:buChar char="•"/>
-        <a:defRPr sz="799" kern="1200">
+        <a:defRPr sz="2560" kern="1200">
           <a:solidFill>
             <a:schemeClr val="tx1"/>
           </a:solidFill>
@@ -2795,16 +2800,16 @@
           <a:cs typeface="+mn-cs"/>
         </a:defRPr>
       </a:lvl6pPr>
-      <a:lvl7pPr marL="1319182" indent="-101476" algn="l" defTabSz="405902" rtl="0" eaLnBrk="1" latinLnBrk="0" hangingPunct="1">
+      <a:lvl7pPr marL="4225900" indent="-325069" algn="l" defTabSz="1300277" rtl="0" eaLnBrk="1" latinLnBrk="0" hangingPunct="1">
         <a:lnSpc>
           <a:spcPct val="90000"/>
         </a:lnSpc>
         <a:spcBef>
-          <a:spcPts val="222"/>
+          <a:spcPts val="711"/>
         </a:spcBef>
         <a:buFont typeface="Arial" panose="020B0604020202020204" pitchFamily="34" charset="0"/>
         <a:buChar char="•"/>
-        <a:defRPr sz="799" kern="1200">
+        <a:defRPr sz="2560" kern="1200">
           <a:solidFill>
             <a:schemeClr val="tx1"/>
           </a:solidFill>
@@ -2813,16 +2818,16 @@
           <a:cs typeface="+mn-cs"/>
         </a:defRPr>
       </a:lvl7pPr>
-      <a:lvl8pPr marL="1522133" indent="-101476" algn="l" defTabSz="405902" rtl="0" eaLnBrk="1" latinLnBrk="0" hangingPunct="1">
+      <a:lvl8pPr marL="4876038" indent="-325069" algn="l" defTabSz="1300277" rtl="0" eaLnBrk="1" latinLnBrk="0" hangingPunct="1">
         <a:lnSpc>
           <a:spcPct val="90000"/>
         </a:lnSpc>
         <a:spcBef>
-          <a:spcPts val="222"/>
+          <a:spcPts val="711"/>
         </a:spcBef>
         <a:buFont typeface="Arial" panose="020B0604020202020204" pitchFamily="34" charset="0"/>
         <a:buChar char="•"/>
-        <a:defRPr sz="799" kern="1200">
+        <a:defRPr sz="2560" kern="1200">
           <a:solidFill>
             <a:schemeClr val="tx1"/>
           </a:solidFill>
@@ -2831,16 +2836,16 @@
           <a:cs typeface="+mn-cs"/>
         </a:defRPr>
       </a:lvl8pPr>
-      <a:lvl9pPr marL="1725084" indent="-101476" algn="l" defTabSz="405902" rtl="0" eaLnBrk="1" latinLnBrk="0" hangingPunct="1">
+      <a:lvl9pPr marL="5526176" indent="-325069" algn="l" defTabSz="1300277" rtl="0" eaLnBrk="1" latinLnBrk="0" hangingPunct="1">
         <a:lnSpc>
           <a:spcPct val="90000"/>
         </a:lnSpc>
         <a:spcBef>
-          <a:spcPts val="222"/>
+          <a:spcPts val="711"/>
         </a:spcBef>
         <a:buFont typeface="Arial" panose="020B0604020202020204" pitchFamily="34" charset="0"/>
         <a:buChar char="•"/>
-        <a:defRPr sz="799" kern="1200">
+        <a:defRPr sz="2560" kern="1200">
           <a:solidFill>
             <a:schemeClr val="tx1"/>
           </a:solidFill>
@@ -2854,8 +2859,8 @@
       <a:defPPr>
         <a:defRPr lang="en-US"/>
       </a:defPPr>
-      <a:lvl1pPr marL="0" algn="l" defTabSz="405902" rtl="0" eaLnBrk="1" latinLnBrk="0" hangingPunct="1">
-        <a:defRPr sz="799" kern="1200">
+      <a:lvl1pPr marL="0" algn="l" defTabSz="1300277" rtl="0" eaLnBrk="1" latinLnBrk="0" hangingPunct="1">
+        <a:defRPr sz="2560" kern="1200">
           <a:solidFill>
             <a:schemeClr val="tx1"/>
           </a:solidFill>
@@ -2864,8 +2869,8 @@
           <a:cs typeface="+mn-cs"/>
         </a:defRPr>
       </a:lvl1pPr>
-      <a:lvl2pPr marL="202951" algn="l" defTabSz="405902" rtl="0" eaLnBrk="1" latinLnBrk="0" hangingPunct="1">
-        <a:defRPr sz="799" kern="1200">
+      <a:lvl2pPr marL="650138" algn="l" defTabSz="1300277" rtl="0" eaLnBrk="1" latinLnBrk="0" hangingPunct="1">
+        <a:defRPr sz="2560" kern="1200">
           <a:solidFill>
             <a:schemeClr val="tx1"/>
           </a:solidFill>
@@ -2874,8 +2879,8 @@
           <a:cs typeface="+mn-cs"/>
         </a:defRPr>
       </a:lvl2pPr>
-      <a:lvl3pPr marL="405902" algn="l" defTabSz="405902" rtl="0" eaLnBrk="1" latinLnBrk="0" hangingPunct="1">
-        <a:defRPr sz="799" kern="1200">
+      <a:lvl3pPr marL="1300277" algn="l" defTabSz="1300277" rtl="0" eaLnBrk="1" latinLnBrk="0" hangingPunct="1">
+        <a:defRPr sz="2560" kern="1200">
           <a:solidFill>
             <a:schemeClr val="tx1"/>
           </a:solidFill>
@@ -2884,8 +2889,8 @@
           <a:cs typeface="+mn-cs"/>
         </a:defRPr>
       </a:lvl3pPr>
-      <a:lvl4pPr marL="608853" algn="l" defTabSz="405902" rtl="0" eaLnBrk="1" latinLnBrk="0" hangingPunct="1">
-        <a:defRPr sz="799" kern="1200">
+      <a:lvl4pPr marL="1950415" algn="l" defTabSz="1300277" rtl="0" eaLnBrk="1" latinLnBrk="0" hangingPunct="1">
+        <a:defRPr sz="2560" kern="1200">
           <a:solidFill>
             <a:schemeClr val="tx1"/>
           </a:solidFill>
@@ -2894,8 +2899,8 @@
           <a:cs typeface="+mn-cs"/>
         </a:defRPr>
       </a:lvl4pPr>
-      <a:lvl5pPr marL="811804" algn="l" defTabSz="405902" rtl="0" eaLnBrk="1" latinLnBrk="0" hangingPunct="1">
-        <a:defRPr sz="799" kern="1200">
+      <a:lvl5pPr marL="2600554" algn="l" defTabSz="1300277" rtl="0" eaLnBrk="1" latinLnBrk="0" hangingPunct="1">
+        <a:defRPr sz="2560" kern="1200">
           <a:solidFill>
             <a:schemeClr val="tx1"/>
           </a:solidFill>
@@ -2904,8 +2909,8 @@
           <a:cs typeface="+mn-cs"/>
         </a:defRPr>
       </a:lvl5pPr>
-      <a:lvl6pPr marL="1014755" algn="l" defTabSz="405902" rtl="0" eaLnBrk="1" latinLnBrk="0" hangingPunct="1">
-        <a:defRPr sz="799" kern="1200">
+      <a:lvl6pPr marL="3250692" algn="l" defTabSz="1300277" rtl="0" eaLnBrk="1" latinLnBrk="0" hangingPunct="1">
+        <a:defRPr sz="2560" kern="1200">
           <a:solidFill>
             <a:schemeClr val="tx1"/>
           </a:solidFill>
@@ -2914,8 +2919,8 @@
           <a:cs typeface="+mn-cs"/>
         </a:defRPr>
       </a:lvl6pPr>
-      <a:lvl7pPr marL="1217706" algn="l" defTabSz="405902" rtl="0" eaLnBrk="1" latinLnBrk="0" hangingPunct="1">
-        <a:defRPr sz="799" kern="1200">
+      <a:lvl7pPr marL="3900830" algn="l" defTabSz="1300277" rtl="0" eaLnBrk="1" latinLnBrk="0" hangingPunct="1">
+        <a:defRPr sz="2560" kern="1200">
           <a:solidFill>
             <a:schemeClr val="tx1"/>
           </a:solidFill>
@@ -2924,8 +2929,8 @@
           <a:cs typeface="+mn-cs"/>
         </a:defRPr>
       </a:lvl7pPr>
-      <a:lvl8pPr marL="1420658" algn="l" defTabSz="405902" rtl="0" eaLnBrk="1" latinLnBrk="0" hangingPunct="1">
-        <a:defRPr sz="799" kern="1200">
+      <a:lvl8pPr marL="4550969" algn="l" defTabSz="1300277" rtl="0" eaLnBrk="1" latinLnBrk="0" hangingPunct="1">
+        <a:defRPr sz="2560" kern="1200">
           <a:solidFill>
             <a:schemeClr val="tx1"/>
           </a:solidFill>
@@ -2934,8 +2939,8 @@
           <a:cs typeface="+mn-cs"/>
         </a:defRPr>
       </a:lvl8pPr>
-      <a:lvl9pPr marL="1623609" algn="l" defTabSz="405902" rtl="0" eaLnBrk="1" latinLnBrk="0" hangingPunct="1">
-        <a:defRPr sz="799" kern="1200">
+      <a:lvl9pPr marL="5201107" algn="l" defTabSz="1300277" rtl="0" eaLnBrk="1" latinLnBrk="0" hangingPunct="1">
+        <a:defRPr sz="2560" kern="1200">
           <a:solidFill>
             <a:schemeClr val="tx1"/>
           </a:solidFill>
@@ -2980,8 +2985,8 @@
         </p:nvGrpSpPr>
         <p:grpSpPr>
           <a:xfrm>
-            <a:off x="525258" y="18051"/>
-            <a:ext cx="3008722" cy="3008722"/>
+            <a:off x="0" y="0"/>
+            <a:ext cx="13003213" cy="13003213"/>
             <a:chOff x="0" y="0"/>
             <a:chExt cx="13003213" cy="13003213"/>
           </a:xfrm>
@@ -3053,7 +3058,7 @@
               </a:fontRef>
             </p:style>
             <p:txBody>
-              <a:bodyPr rot="0" spcFirstLastPara="0" vertOverflow="overflow" horzOverflow="overflow" vert="horz" wrap="square" lIns="21158" tIns="10578" rIns="21158" bIns="10578" numCol="1" spcCol="0" rtlCol="0" fromWordArt="0" anchor="ctr" anchorCtr="0" forceAA="0" compatLnSpc="1">
+              <a:bodyPr rot="0" spcFirstLastPara="0" vertOverflow="overflow" horzOverflow="overflow" vert="horz" wrap="square" lIns="67777" tIns="33885" rIns="67777" bIns="33885" numCol="1" spcCol="0" rtlCol="0" fromWordArt="0" anchor="ctr" anchorCtr="0" forceAA="0" compatLnSpc="1">
                 <a:prstTxWarp prst="textNoShape">
                   <a:avLst/>
                 </a:prstTxWarp>
@@ -3062,7 +3067,7 @@
               <a:lstStyle/>
               <a:p>
                 <a:pPr algn="ctr"/>
-                <a:endParaRPr lang="en-US" sz="568"/>
+                <a:endParaRPr lang="en-US" sz="1820"/>
               </a:p>
             </p:txBody>
           </p:sp>
@@ -3106,7 +3111,7 @@
               </a:fontRef>
             </p:style>
             <p:txBody>
-              <a:bodyPr rot="0" spcFirstLastPara="0" vertOverflow="overflow" horzOverflow="overflow" vert="horz" wrap="square" lIns="21158" tIns="10578" rIns="21158" bIns="10578" numCol="1" spcCol="0" rtlCol="0" fromWordArt="0" anchor="ctr" anchorCtr="0" forceAA="0" compatLnSpc="1">
+              <a:bodyPr rot="0" spcFirstLastPara="0" vertOverflow="overflow" horzOverflow="overflow" vert="horz" wrap="square" lIns="67777" tIns="33885" rIns="67777" bIns="33885" numCol="1" spcCol="0" rtlCol="0" fromWordArt="0" anchor="ctr" anchorCtr="0" forceAA="0" compatLnSpc="1">
                 <a:prstTxWarp prst="textNoShape">
                   <a:avLst/>
                 </a:prstTxWarp>
@@ -3115,7 +3120,7 @@
               <a:lstStyle/>
               <a:p>
                 <a:pPr algn="ctr"/>
-                <a:endParaRPr lang="en-US" sz="568">
+                <a:endParaRPr lang="en-US" sz="1820">
                   <a:solidFill>
                     <a:schemeClr val="tx1"/>
                   </a:solidFill>
@@ -3187,7 +3192,7 @@
               </a:fontRef>
             </p:style>
             <p:txBody>
-              <a:bodyPr rot="0" spcFirstLastPara="0" vertOverflow="overflow" horzOverflow="overflow" vert="horz" wrap="square" lIns="21158" tIns="10578" rIns="21158" bIns="10578" numCol="1" spcCol="0" rtlCol="0" fromWordArt="0" anchor="ctr" anchorCtr="0" forceAA="0" compatLnSpc="1">
+              <a:bodyPr rot="0" spcFirstLastPara="0" vertOverflow="overflow" horzOverflow="overflow" vert="horz" wrap="square" lIns="67777" tIns="33885" rIns="67777" bIns="33885" numCol="1" spcCol="0" rtlCol="0" fromWordArt="0" anchor="ctr" anchorCtr="0" forceAA="0" compatLnSpc="1">
                 <a:prstTxWarp prst="textNoShape">
                   <a:avLst/>
                 </a:prstTxWarp>
@@ -3196,7 +3201,7 @@
               <a:lstStyle/>
               <a:p>
                 <a:pPr algn="ctr"/>
-                <a:endParaRPr lang="en-US" sz="568"/>
+                <a:endParaRPr lang="en-US" sz="1820"/>
               </a:p>
             </p:txBody>
           </p:sp>
@@ -3242,7 +3247,7 @@
               </a:fontRef>
             </p:style>
             <p:txBody>
-              <a:bodyPr rot="0" spcFirstLastPara="0" vertOverflow="overflow" horzOverflow="overflow" vert="horz" wrap="square" lIns="21158" tIns="10578" rIns="21158" bIns="10578" numCol="1" spcCol="0" rtlCol="0" fromWordArt="0" anchor="ctr" anchorCtr="0" forceAA="0" compatLnSpc="1">
+              <a:bodyPr rot="0" spcFirstLastPara="0" vertOverflow="overflow" horzOverflow="overflow" vert="horz" wrap="square" lIns="67777" tIns="33885" rIns="67777" bIns="33885" numCol="1" spcCol="0" rtlCol="0" fromWordArt="0" anchor="ctr" anchorCtr="0" forceAA="0" compatLnSpc="1">
                 <a:prstTxWarp prst="textNoShape">
                   <a:avLst/>
                 </a:prstTxWarp>
@@ -3251,7 +3256,7 @@
               <a:lstStyle/>
               <a:p>
                 <a:pPr algn="ctr"/>
-                <a:endParaRPr lang="en-US" sz="568">
+                <a:endParaRPr lang="en-US" sz="1820">
                   <a:solidFill>
                     <a:schemeClr val="tx1"/>
                   </a:solidFill>
@@ -3299,7 +3304,7 @@
               </a:fontRef>
             </p:style>
             <p:txBody>
-              <a:bodyPr rot="0" spcFirstLastPara="0" vertOverflow="overflow" horzOverflow="overflow" vert="horz" wrap="square" lIns="21158" tIns="10578" rIns="21158" bIns="10578" numCol="1" spcCol="0" rtlCol="0" fromWordArt="0" anchor="ctr" anchorCtr="0" forceAA="0" compatLnSpc="1">
+              <a:bodyPr rot="0" spcFirstLastPara="0" vertOverflow="overflow" horzOverflow="overflow" vert="horz" wrap="square" lIns="67777" tIns="33885" rIns="67777" bIns="33885" numCol="1" spcCol="0" rtlCol="0" fromWordArt="0" anchor="ctr" anchorCtr="0" forceAA="0" compatLnSpc="1">
                 <a:prstTxWarp prst="textNoShape">
                   <a:avLst/>
                 </a:prstTxWarp>
@@ -3308,7 +3313,7 @@
               <a:lstStyle/>
               <a:p>
                 <a:pPr algn="ctr"/>
-                <a:endParaRPr lang="en-US" sz="568"/>
+                <a:endParaRPr lang="en-US" sz="1820"/>
               </a:p>
             </p:txBody>
           </p:sp>
@@ -3377,7 +3382,7 @@
               </a:fontRef>
             </p:style>
             <p:txBody>
-              <a:bodyPr rot="0" spcFirstLastPara="0" vertOverflow="overflow" horzOverflow="overflow" vert="horz" wrap="square" lIns="21158" tIns="10578" rIns="21158" bIns="10578" numCol="1" spcCol="0" rtlCol="0" fromWordArt="0" anchor="ctr" anchorCtr="0" forceAA="0" compatLnSpc="1">
+              <a:bodyPr rot="0" spcFirstLastPara="0" vertOverflow="overflow" horzOverflow="overflow" vert="horz" wrap="square" lIns="67777" tIns="33885" rIns="67777" bIns="33885" numCol="1" spcCol="0" rtlCol="0" fromWordArt="0" anchor="ctr" anchorCtr="0" forceAA="0" compatLnSpc="1">
                 <a:prstTxWarp prst="textNoShape">
                   <a:avLst/>
                 </a:prstTxWarp>
@@ -3386,7 +3391,7 @@
               <a:lstStyle/>
               <a:p>
                 <a:pPr algn="ctr"/>
-                <a:endParaRPr lang="en-US" sz="568">
+                <a:endParaRPr lang="en-US" sz="1820">
                   <a:solidFill>
                     <a:schemeClr val="tx1"/>
                   </a:solidFill>
@@ -3432,7 +3437,7 @@
               </a:fontRef>
             </p:style>
             <p:txBody>
-              <a:bodyPr rot="0" spcFirstLastPara="0" vertOverflow="overflow" horzOverflow="overflow" vert="horz" wrap="square" lIns="21158" tIns="10578" rIns="21158" bIns="10578" numCol="1" spcCol="0" rtlCol="0" fromWordArt="0" anchor="ctr" anchorCtr="0" forceAA="0" compatLnSpc="1">
+              <a:bodyPr rot="0" spcFirstLastPara="0" vertOverflow="overflow" horzOverflow="overflow" vert="horz" wrap="square" lIns="67777" tIns="33885" rIns="67777" bIns="33885" numCol="1" spcCol="0" rtlCol="0" fromWordArt="0" anchor="ctr" anchorCtr="0" forceAA="0" compatLnSpc="1">
                 <a:prstTxWarp prst="textNoShape">
                   <a:avLst/>
                 </a:prstTxWarp>
@@ -3441,7 +3446,7 @@
               <a:lstStyle/>
               <a:p>
                 <a:pPr algn="ctr"/>
-                <a:endParaRPr lang="en-US" sz="568"/>
+                <a:endParaRPr lang="en-US" sz="1820"/>
               </a:p>
             </p:txBody>
           </p:sp>
@@ -3513,7 +3518,7 @@
               </a:fontRef>
             </p:style>
             <p:txBody>
-              <a:bodyPr rot="0" spcFirstLastPara="0" vertOverflow="overflow" horzOverflow="overflow" vert="horz" wrap="square" lIns="21158" tIns="10578" rIns="21158" bIns="10578" numCol="1" spcCol="0" rtlCol="0" fromWordArt="0" anchor="ctr" anchorCtr="0" forceAA="0" compatLnSpc="1">
+              <a:bodyPr rot="0" spcFirstLastPara="0" vertOverflow="overflow" horzOverflow="overflow" vert="horz" wrap="square" lIns="67777" tIns="33885" rIns="67777" bIns="33885" numCol="1" spcCol="0" rtlCol="0" fromWordArt="0" anchor="ctr" anchorCtr="0" forceAA="0" compatLnSpc="1">
                 <a:prstTxWarp prst="textNoShape">
                   <a:avLst/>
                 </a:prstTxWarp>
@@ -3522,7 +3527,7 @@
               <a:lstStyle/>
               <a:p>
                 <a:pPr algn="ctr"/>
-                <a:endParaRPr lang="en-US" sz="568">
+                <a:endParaRPr lang="en-US" sz="1820">
                   <a:solidFill>
                     <a:schemeClr val="tx1"/>
                   </a:solidFill>
@@ -3621,7 +3626,7 @@
               </a:fontRef>
             </p:style>
             <p:txBody>
-              <a:bodyPr rot="0" spcFirstLastPara="0" vertOverflow="overflow" horzOverflow="overflow" vert="horz" wrap="square" lIns="21158" tIns="10578" rIns="21158" bIns="10578" numCol="1" spcCol="0" rtlCol="0" fromWordArt="0" anchor="ctr" anchorCtr="0" forceAA="0" compatLnSpc="1">
+              <a:bodyPr rot="0" spcFirstLastPara="0" vertOverflow="overflow" horzOverflow="overflow" vert="horz" wrap="square" lIns="67777" tIns="33885" rIns="67777" bIns="33885" numCol="1" spcCol="0" rtlCol="0" fromWordArt="0" anchor="ctr" anchorCtr="0" forceAA="0" compatLnSpc="1">
                 <a:prstTxWarp prst="textNoShape">
                   <a:avLst/>
                 </a:prstTxWarp>
@@ -3630,7 +3635,7 @@
               <a:lstStyle/>
               <a:p>
                 <a:pPr algn="ctr"/>
-                <a:endParaRPr lang="en-US" sz="568" dirty="0">
+                <a:endParaRPr lang="en-US" sz="1820" dirty="0">
                   <a:solidFill>
                     <a:schemeClr val="tx1"/>
                   </a:solidFill>
@@ -3680,7 +3685,7 @@
               </a:fontRef>
             </p:style>
             <p:txBody>
-              <a:bodyPr rot="0" spcFirstLastPara="0" vertOverflow="overflow" horzOverflow="overflow" vert="horz" wrap="square" lIns="21158" tIns="10578" rIns="21158" bIns="10578" numCol="1" spcCol="0" rtlCol="0" fromWordArt="0" anchor="ctr" anchorCtr="0" forceAA="0" compatLnSpc="1">
+              <a:bodyPr rot="0" spcFirstLastPara="0" vertOverflow="overflow" horzOverflow="overflow" vert="horz" wrap="square" lIns="67777" tIns="33885" rIns="67777" bIns="33885" numCol="1" spcCol="0" rtlCol="0" fromWordArt="0" anchor="ctr" anchorCtr="0" forceAA="0" compatLnSpc="1">
                 <a:prstTxWarp prst="textNoShape">
                   <a:avLst/>
                 </a:prstTxWarp>
@@ -3689,7 +3694,7 @@
               <a:lstStyle/>
               <a:p>
                 <a:pPr algn="ctr"/>
-                <a:endParaRPr lang="en-US" sz="568" dirty="0">
+                <a:endParaRPr lang="en-US" sz="1820" dirty="0">
                   <a:solidFill>
                     <a:schemeClr val="tx1"/>
                   </a:solidFill>
@@ -3761,7 +3766,7 @@
               </a:fontRef>
             </p:style>
             <p:txBody>
-              <a:bodyPr rot="0" spcFirstLastPara="0" vertOverflow="overflow" horzOverflow="overflow" vert="horz" wrap="square" lIns="21158" tIns="10578" rIns="21158" bIns="10578" numCol="1" spcCol="0" rtlCol="0" fromWordArt="0" anchor="ctr" anchorCtr="0" forceAA="0" compatLnSpc="1">
+              <a:bodyPr rot="0" spcFirstLastPara="0" vertOverflow="overflow" horzOverflow="overflow" vert="horz" wrap="square" lIns="67777" tIns="33885" rIns="67777" bIns="33885" numCol="1" spcCol="0" rtlCol="0" fromWordArt="0" anchor="ctr" anchorCtr="0" forceAA="0" compatLnSpc="1">
                 <a:prstTxWarp prst="textNoShape">
                   <a:avLst/>
                 </a:prstTxWarp>
@@ -3770,7 +3775,7 @@
               <a:lstStyle/>
               <a:p>
                 <a:pPr algn="ctr"/>
-                <a:endParaRPr lang="en-US" sz="568"/>
+                <a:endParaRPr lang="en-US" sz="1820"/>
               </a:p>
             </p:txBody>
           </p:sp>
@@ -3816,7 +3821,7 @@
               </a:fontRef>
             </p:style>
             <p:txBody>
-              <a:bodyPr rot="0" spcFirstLastPara="0" vertOverflow="overflow" horzOverflow="overflow" vert="horz" wrap="square" lIns="21158" tIns="10578" rIns="21158" bIns="10578" numCol="1" spcCol="0" rtlCol="0" fromWordArt="0" anchor="ctr" anchorCtr="0" forceAA="0" compatLnSpc="1">
+              <a:bodyPr rot="0" spcFirstLastPara="0" vertOverflow="overflow" horzOverflow="overflow" vert="horz" wrap="square" lIns="67777" tIns="33885" rIns="67777" bIns="33885" numCol="1" spcCol="0" rtlCol="0" fromWordArt="0" anchor="ctr" anchorCtr="0" forceAA="0" compatLnSpc="1">
                 <a:prstTxWarp prst="textNoShape">
                   <a:avLst/>
                 </a:prstTxWarp>
@@ -3825,7 +3830,7 @@
               <a:lstStyle/>
               <a:p>
                 <a:pPr algn="ctr"/>
-                <a:endParaRPr lang="en-US" sz="568">
+                <a:endParaRPr lang="en-US" sz="1820">
                   <a:solidFill>
                     <a:schemeClr val="tx1"/>
                   </a:solidFill>
@@ -3873,7 +3878,7 @@
               </a:fontRef>
             </p:style>
             <p:txBody>
-              <a:bodyPr rot="0" spcFirstLastPara="0" vertOverflow="overflow" horzOverflow="overflow" vert="horz" wrap="square" lIns="21158" tIns="10578" rIns="21158" bIns="10578" numCol="1" spcCol="0" rtlCol="0" fromWordArt="0" anchor="ctr" anchorCtr="0" forceAA="0" compatLnSpc="1">
+              <a:bodyPr rot="0" spcFirstLastPara="0" vertOverflow="overflow" horzOverflow="overflow" vert="horz" wrap="square" lIns="67777" tIns="33885" rIns="67777" bIns="33885" numCol="1" spcCol="0" rtlCol="0" fromWordArt="0" anchor="ctr" anchorCtr="0" forceAA="0" compatLnSpc="1">
                 <a:prstTxWarp prst="textNoShape">
                   <a:avLst/>
                 </a:prstTxWarp>
@@ -3882,7 +3887,7 @@
               <a:lstStyle/>
               <a:p>
                 <a:pPr algn="ctr"/>
-                <a:endParaRPr lang="en-US" sz="568"/>
+                <a:endParaRPr lang="en-US" sz="1820"/>
               </a:p>
             </p:txBody>
           </p:sp>

</xml_diff>